<commit_message>
Fix fontawesome links and icons, closes #271
</commit_message>
<xml_diff>
--- a/powerpoints/0-template.pptx
+++ b/powerpoints/0-template.pptx
@@ -311,6 +311,11 @@
       </a:defRPr>
     </a:lvl9pPr>
   </p:defaultTextStyle>
+  <p:extLst>
+    <p:ext uri="{EFAFB233-063F-42B5-8137-9DF3F51BA10A}">
+      <p15:sldGuideLst xmlns:p15="http://schemas.microsoft.com/office/powerpoint/2012/main"/>
+    </p:ext>
+  </p:extLst>
 </p:presentation>
 </file>
 
@@ -2262,7 +2267,7 @@
           </a:ln>
           <a:extLst>
             <a:ext uri="{C572A759-6A51-4108-AA02-DFA0A04FC94B}">
-              <ma14:wrappingTextBoxFlag xmlns:ma14="http://schemas.microsoft.com/office/mac/drawingml/2011/main" xmlns:a14="http://schemas.microsoft.com/office/drawing/2010/main" xmlns:m="http://schemas.openxmlformats.org/officeDocument/2006/math" xmlns="" val="1"/>
+              <ma14:wrappingTextBoxFlag xmlns="" xmlns:m="http://schemas.openxmlformats.org/officeDocument/2006/math" xmlns:a14="http://schemas.microsoft.com/office/drawing/2010/main" xmlns:ma14="http://schemas.microsoft.com/office/mac/drawingml/2011/main" val="1"/>
             </a:ext>
           </a:extLst>
         </p:spPr>
@@ -2301,7 +2306,7 @@
           </a:ln>
           <a:extLst>
             <a:ext uri="{C572A759-6A51-4108-AA02-DFA0A04FC94B}">
-              <ma14:wrappingTextBoxFlag xmlns:ma14="http://schemas.microsoft.com/office/mac/drawingml/2011/main" xmlns:a14="http://schemas.microsoft.com/office/drawing/2010/main" xmlns:m="http://schemas.openxmlformats.org/officeDocument/2006/math" xmlns="" val="1"/>
+              <ma14:wrappingTextBoxFlag xmlns="" xmlns:m="http://schemas.openxmlformats.org/officeDocument/2006/math" xmlns:a14="http://schemas.microsoft.com/office/drawing/2010/main" xmlns:ma14="http://schemas.microsoft.com/office/mac/drawingml/2011/main" val="1"/>
             </a:ext>
           </a:extLst>
         </p:spPr>
@@ -4125,7 +4130,7 @@
           </a:ln>
           <a:extLst>
             <a:ext uri="{C572A759-6A51-4108-AA02-DFA0A04FC94B}">
-              <ma14:wrappingTextBoxFlag xmlns:ma14="http://schemas.microsoft.com/office/mac/drawingml/2011/main" xmlns:a14="http://schemas.microsoft.com/office/drawing/2010/main" xmlns:m="http://schemas.openxmlformats.org/officeDocument/2006/math" xmlns="" val="1"/>
+              <ma14:wrappingTextBoxFlag xmlns="" xmlns:m="http://schemas.openxmlformats.org/officeDocument/2006/math" xmlns:a14="http://schemas.microsoft.com/office/drawing/2010/main" xmlns:ma14="http://schemas.microsoft.com/office/mac/drawingml/2011/main" val="1"/>
             </a:ext>
           </a:extLst>
         </p:spPr>
@@ -4198,7 +4203,7 @@
           </a:ln>
           <a:extLst>
             <a:ext uri="{C572A759-6A51-4108-AA02-DFA0A04FC94B}">
-              <ma14:wrappingTextBoxFlag xmlns:ma14="http://schemas.microsoft.com/office/mac/drawingml/2011/main" xmlns:a14="http://schemas.microsoft.com/office/drawing/2010/main" xmlns:m="http://schemas.openxmlformats.org/officeDocument/2006/math" xmlns="" val="1"/>
+              <ma14:wrappingTextBoxFlag xmlns="" xmlns:m="http://schemas.openxmlformats.org/officeDocument/2006/math" xmlns:a14="http://schemas.microsoft.com/office/drawing/2010/main" xmlns:ma14="http://schemas.microsoft.com/office/mac/drawingml/2011/main" val="1"/>
             </a:ext>
           </a:extLst>
         </p:spPr>
@@ -4329,7 +4334,7 @@
           </a:ln>
           <a:extLst>
             <a:ext uri="{C572A759-6A51-4108-AA02-DFA0A04FC94B}">
-              <ma14:wrappingTextBoxFlag xmlns:ma14="http://schemas.microsoft.com/office/mac/drawingml/2011/main" xmlns:a14="http://schemas.microsoft.com/office/drawing/2010/main" xmlns:m="http://schemas.openxmlformats.org/officeDocument/2006/math" xmlns="" val="1"/>
+              <ma14:wrappingTextBoxFlag xmlns="" xmlns:m="http://schemas.openxmlformats.org/officeDocument/2006/math" xmlns:a14="http://schemas.microsoft.com/office/drawing/2010/main" xmlns:ma14="http://schemas.microsoft.com/office/mac/drawingml/2011/main" val="1"/>
             </a:ext>
           </a:extLst>
         </p:spPr>
@@ -4453,7 +4458,7 @@
           </a:ln>
           <a:extLst>
             <a:ext uri="{C572A759-6A51-4108-AA02-DFA0A04FC94B}">
-              <ma14:wrappingTextBoxFlag xmlns:ma14="http://schemas.microsoft.com/office/mac/drawingml/2011/main" xmlns:a14="http://schemas.microsoft.com/office/drawing/2010/main" xmlns:m="http://schemas.openxmlformats.org/officeDocument/2006/math" xmlns="" val="1"/>
+              <ma14:wrappingTextBoxFlag xmlns="" xmlns:m="http://schemas.openxmlformats.org/officeDocument/2006/math" xmlns:a14="http://schemas.microsoft.com/office/drawing/2010/main" xmlns:ma14="http://schemas.microsoft.com/office/mac/drawingml/2011/main" val="1"/>
             </a:ext>
           </a:extLst>
         </p:spPr>
@@ -4508,7 +4513,7 @@
           </a:ln>
           <a:extLst>
             <a:ext uri="{C572A759-6A51-4108-AA02-DFA0A04FC94B}">
-              <ma14:wrappingTextBoxFlag xmlns:ma14="http://schemas.microsoft.com/office/mac/drawingml/2011/main" xmlns:a14="http://schemas.microsoft.com/office/drawing/2010/main" xmlns:m="http://schemas.openxmlformats.org/officeDocument/2006/math" xmlns="" val="1"/>
+              <ma14:wrappingTextBoxFlag xmlns="" xmlns:m="http://schemas.openxmlformats.org/officeDocument/2006/math" xmlns:a14="http://schemas.microsoft.com/office/drawing/2010/main" xmlns:ma14="http://schemas.microsoft.com/office/mac/drawingml/2011/main" val="1"/>
             </a:ext>
           </a:extLst>
         </p:spPr>
@@ -4567,7 +4572,7 @@
           </a:ln>
           <a:extLst>
             <a:ext uri="{C572A759-6A51-4108-AA02-DFA0A04FC94B}">
-              <ma14:wrappingTextBoxFlag xmlns:ma14="http://schemas.microsoft.com/office/mac/drawingml/2011/main" xmlns:a14="http://schemas.microsoft.com/office/drawing/2010/main" xmlns:m="http://schemas.openxmlformats.org/officeDocument/2006/math" xmlns="" val="1"/>
+              <ma14:wrappingTextBoxFlag xmlns="" xmlns:m="http://schemas.openxmlformats.org/officeDocument/2006/math" xmlns:a14="http://schemas.microsoft.com/office/drawing/2010/main" xmlns:ma14="http://schemas.microsoft.com/office/mac/drawingml/2011/main" val="1"/>
             </a:ext>
           </a:extLst>
         </p:spPr>
@@ -4677,7 +4682,7 @@
             <a:effectLst/>
             <a:extLst>
               <a:ext uri="{C572A759-6A51-4108-AA02-DFA0A04FC94B}">
-                <ma14:wrappingTextBoxFlag xmlns:ma14="http://schemas.microsoft.com/office/mac/drawingml/2011/main" xmlns:a14="http://schemas.microsoft.com/office/drawing/2010/main" xmlns:m="http://schemas.openxmlformats.org/officeDocument/2006/math" xmlns="" val="1"/>
+                <ma14:wrappingTextBoxFlag xmlns="" xmlns:m="http://schemas.openxmlformats.org/officeDocument/2006/math" xmlns:a14="http://schemas.microsoft.com/office/drawing/2010/main" xmlns:ma14="http://schemas.microsoft.com/office/mac/drawingml/2011/main" val="1"/>
               </a:ext>
             </a:extLst>
           </p:spPr>
@@ -4727,7 +4732,7 @@
           </a:ln>
           <a:extLst>
             <a:ext uri="{C572A759-6A51-4108-AA02-DFA0A04FC94B}">
-              <ma14:wrappingTextBoxFlag xmlns:ma14="http://schemas.microsoft.com/office/mac/drawingml/2011/main" xmlns:a14="http://schemas.microsoft.com/office/drawing/2010/main" xmlns:m="http://schemas.openxmlformats.org/officeDocument/2006/math" xmlns="" val="1"/>
+              <ma14:wrappingTextBoxFlag xmlns="" xmlns:m="http://schemas.openxmlformats.org/officeDocument/2006/math" xmlns:a14="http://schemas.microsoft.com/office/drawing/2010/main" xmlns:ma14="http://schemas.microsoft.com/office/mac/drawingml/2011/main" val="1"/>
             </a:ext>
           </a:extLst>
         </p:spPr>
@@ -4787,7 +4792,7 @@
           </a:ln>
           <a:extLst>
             <a:ext uri="{C572A759-6A51-4108-AA02-DFA0A04FC94B}">
-              <ma14:wrappingTextBoxFlag xmlns:ma14="http://schemas.microsoft.com/office/mac/drawingml/2011/main" xmlns:a14="http://schemas.microsoft.com/office/drawing/2010/main" xmlns:m="http://schemas.openxmlformats.org/officeDocument/2006/math" xmlns="" val="1"/>
+              <ma14:wrappingTextBoxFlag xmlns="" xmlns:m="http://schemas.openxmlformats.org/officeDocument/2006/math" xmlns:a14="http://schemas.microsoft.com/office/drawing/2010/main" xmlns:ma14="http://schemas.microsoft.com/office/mac/drawingml/2011/main" val="1"/>
             </a:ext>
           </a:extLst>
         </p:spPr>
@@ -4847,7 +4852,7 @@
           </a:ln>
           <a:extLst>
             <a:ext uri="{C572A759-6A51-4108-AA02-DFA0A04FC94B}">
-              <ma14:wrappingTextBoxFlag xmlns:ma14="http://schemas.microsoft.com/office/mac/drawingml/2011/main" xmlns:a14="http://schemas.microsoft.com/office/drawing/2010/main" xmlns:m="http://schemas.openxmlformats.org/officeDocument/2006/math" xmlns="" val="1"/>
+              <ma14:wrappingTextBoxFlag xmlns="" xmlns:m="http://schemas.openxmlformats.org/officeDocument/2006/math" xmlns:a14="http://schemas.microsoft.com/office/drawing/2010/main" xmlns:ma14="http://schemas.microsoft.com/office/mac/drawingml/2011/main" val="1"/>
             </a:ext>
           </a:extLst>
         </p:spPr>
@@ -4907,7 +4912,7 @@
           </a:ln>
           <a:extLst>
             <a:ext uri="{C572A759-6A51-4108-AA02-DFA0A04FC94B}">
-              <ma14:wrappingTextBoxFlag xmlns:ma14="http://schemas.microsoft.com/office/mac/drawingml/2011/main" xmlns:a14="http://schemas.microsoft.com/office/drawing/2010/main" xmlns:m="http://schemas.openxmlformats.org/officeDocument/2006/math" xmlns="" val="1"/>
+              <ma14:wrappingTextBoxFlag xmlns="" xmlns:m="http://schemas.openxmlformats.org/officeDocument/2006/math" xmlns:a14="http://schemas.microsoft.com/office/drawing/2010/main" xmlns:ma14="http://schemas.microsoft.com/office/mac/drawingml/2011/main" val="1"/>
             </a:ext>
           </a:extLst>
         </p:spPr>
@@ -4967,7 +4972,7 @@
           </a:ln>
           <a:extLst>
             <a:ext uri="{C572A759-6A51-4108-AA02-DFA0A04FC94B}">
-              <ma14:wrappingTextBoxFlag xmlns:ma14="http://schemas.microsoft.com/office/mac/drawingml/2011/main" xmlns:a14="http://schemas.microsoft.com/office/drawing/2010/main" xmlns:m="http://schemas.openxmlformats.org/officeDocument/2006/math" xmlns="" val="1"/>
+              <ma14:wrappingTextBoxFlag xmlns="" xmlns:m="http://schemas.openxmlformats.org/officeDocument/2006/math" xmlns:a14="http://schemas.microsoft.com/office/drawing/2010/main" xmlns:ma14="http://schemas.microsoft.com/office/mac/drawingml/2011/main" val="1"/>
             </a:ext>
           </a:extLst>
         </p:spPr>
@@ -5047,7 +5052,7 @@
           </a:ln>
           <a:extLst>
             <a:ext uri="{C572A759-6A51-4108-AA02-DFA0A04FC94B}">
-              <ma14:wrappingTextBoxFlag xmlns:ma14="http://schemas.microsoft.com/office/mac/drawingml/2011/main" xmlns:a14="http://schemas.microsoft.com/office/drawing/2010/main" xmlns:m="http://schemas.openxmlformats.org/officeDocument/2006/math" xmlns="" val="1"/>
+              <ma14:wrappingTextBoxFlag xmlns="" xmlns:m="http://schemas.openxmlformats.org/officeDocument/2006/math" xmlns:a14="http://schemas.microsoft.com/office/drawing/2010/main" xmlns:ma14="http://schemas.microsoft.com/office/mac/drawingml/2011/main" val="1"/>
             </a:ext>
           </a:extLst>
         </p:spPr>
@@ -5149,7 +5154,7 @@
             <a:effectLst/>
             <a:extLst>
               <a:ext uri="{C572A759-6A51-4108-AA02-DFA0A04FC94B}">
-                <ma14:wrappingTextBoxFlag xmlns:ma14="http://schemas.microsoft.com/office/mac/drawingml/2011/main" xmlns:a14="http://schemas.microsoft.com/office/drawing/2010/main" xmlns:m="http://schemas.openxmlformats.org/officeDocument/2006/math" xmlns="" val="1"/>
+                <ma14:wrappingTextBoxFlag xmlns="" xmlns:m="http://schemas.openxmlformats.org/officeDocument/2006/math" xmlns:a14="http://schemas.microsoft.com/office/drawing/2010/main" xmlns:ma14="http://schemas.microsoft.com/office/mac/drawingml/2011/main" val="1"/>
               </a:ext>
             </a:extLst>
           </p:spPr>
@@ -5235,7 +5240,7 @@
           </a:ln>
           <a:extLst>
             <a:ext uri="{C572A759-6A51-4108-AA02-DFA0A04FC94B}">
-              <ma14:wrappingTextBoxFlag xmlns:ma14="http://schemas.microsoft.com/office/mac/drawingml/2011/main" xmlns:a14="http://schemas.microsoft.com/office/drawing/2010/main" xmlns:m="http://schemas.openxmlformats.org/officeDocument/2006/math" xmlns="" val="1"/>
+              <ma14:wrappingTextBoxFlag xmlns="" xmlns:m="http://schemas.openxmlformats.org/officeDocument/2006/math" xmlns:a14="http://schemas.microsoft.com/office/drawing/2010/main" xmlns:ma14="http://schemas.microsoft.com/office/mac/drawingml/2011/main" val="1"/>
             </a:ext>
           </a:extLst>
         </p:spPr>
@@ -5312,7 +5317,7 @@
           </a:ln>
           <a:extLst>
             <a:ext uri="{C572A759-6A51-4108-AA02-DFA0A04FC94B}">
-              <ma14:wrappingTextBoxFlag xmlns:ma14="http://schemas.microsoft.com/office/mac/drawingml/2011/main" xmlns:a14="http://schemas.microsoft.com/office/drawing/2010/main" xmlns:m="http://schemas.openxmlformats.org/officeDocument/2006/math" xmlns="" val="1"/>
+              <ma14:wrappingTextBoxFlag xmlns="" xmlns:m="http://schemas.openxmlformats.org/officeDocument/2006/math" xmlns:a14="http://schemas.microsoft.com/office/drawing/2010/main" xmlns:ma14="http://schemas.microsoft.com/office/mac/drawingml/2011/main" val="1"/>
             </a:ext>
           </a:extLst>
         </p:spPr>
@@ -5389,7 +5394,7 @@
           </a:ln>
           <a:extLst>
             <a:ext uri="{C572A759-6A51-4108-AA02-DFA0A04FC94B}">
-              <ma14:wrappingTextBoxFlag xmlns:ma14="http://schemas.microsoft.com/office/mac/drawingml/2011/main" xmlns:a14="http://schemas.microsoft.com/office/drawing/2010/main" xmlns:m="http://schemas.openxmlformats.org/officeDocument/2006/math" xmlns="" val="1"/>
+              <ma14:wrappingTextBoxFlag xmlns="" xmlns:m="http://schemas.openxmlformats.org/officeDocument/2006/math" xmlns:a14="http://schemas.microsoft.com/office/drawing/2010/main" xmlns:ma14="http://schemas.microsoft.com/office/mac/drawingml/2011/main" val="1"/>
             </a:ext>
           </a:extLst>
         </p:spPr>
@@ -5623,7 +5628,7 @@
             <a:effectLst/>
             <a:extLst>
               <a:ext uri="{C572A759-6A51-4108-AA02-DFA0A04FC94B}">
-                <ma14:wrappingTextBoxFlag xmlns:ma14="http://schemas.microsoft.com/office/mac/drawingml/2011/main" xmlns:a14="http://schemas.microsoft.com/office/drawing/2010/main" xmlns:m="http://schemas.openxmlformats.org/officeDocument/2006/math" xmlns="" val="1"/>
+                <ma14:wrappingTextBoxFlag xmlns="" xmlns:m="http://schemas.openxmlformats.org/officeDocument/2006/math" xmlns:a14="http://schemas.microsoft.com/office/drawing/2010/main" xmlns:ma14="http://schemas.microsoft.com/office/mac/drawingml/2011/main" val="1"/>
               </a:ext>
             </a:extLst>
           </p:spPr>
@@ -5794,7 +5799,7 @@
             <a:effectLst/>
             <a:extLst>
               <a:ext uri="{C572A759-6A51-4108-AA02-DFA0A04FC94B}">
-                <ma14:wrappingTextBoxFlag xmlns:ma14="http://schemas.microsoft.com/office/mac/drawingml/2011/main" xmlns:a14="http://schemas.microsoft.com/office/drawing/2010/main" xmlns:m="http://schemas.openxmlformats.org/officeDocument/2006/math" xmlns="" val="1"/>
+                <ma14:wrappingTextBoxFlag xmlns="" xmlns:m="http://schemas.openxmlformats.org/officeDocument/2006/math" xmlns:a14="http://schemas.microsoft.com/office/drawing/2010/main" xmlns:ma14="http://schemas.microsoft.com/office/mac/drawingml/2011/main" val="1"/>
               </a:ext>
             </a:extLst>
           </p:spPr>
@@ -5908,7 +5913,7 @@
             <a:effectLst/>
             <a:extLst>
               <a:ext uri="{C572A759-6A51-4108-AA02-DFA0A04FC94B}">
-                <ma14:wrappingTextBoxFlag xmlns:ma14="http://schemas.microsoft.com/office/mac/drawingml/2011/main" xmlns:a14="http://schemas.microsoft.com/office/drawing/2010/main" xmlns:m="http://schemas.openxmlformats.org/officeDocument/2006/math" xmlns="" val="1"/>
+                <ma14:wrappingTextBoxFlag xmlns="" xmlns:m="http://schemas.openxmlformats.org/officeDocument/2006/math" xmlns:a14="http://schemas.microsoft.com/office/drawing/2010/main" xmlns:ma14="http://schemas.microsoft.com/office/mac/drawingml/2011/main" val="1"/>
               </a:ext>
             </a:extLst>
           </p:spPr>
@@ -5974,7 +5979,7 @@
             <a:effectLst/>
             <a:extLst>
               <a:ext uri="{C572A759-6A51-4108-AA02-DFA0A04FC94B}">
-                <ma14:wrappingTextBoxFlag xmlns:ma14="http://schemas.microsoft.com/office/mac/drawingml/2011/main" xmlns:a14="http://schemas.microsoft.com/office/drawing/2010/main" xmlns:m="http://schemas.openxmlformats.org/officeDocument/2006/math" xmlns="" val="1"/>
+                <ma14:wrappingTextBoxFlag xmlns="" xmlns:m="http://schemas.openxmlformats.org/officeDocument/2006/math" xmlns:a14="http://schemas.microsoft.com/office/drawing/2010/main" xmlns:ma14="http://schemas.microsoft.com/office/mac/drawingml/2011/main" val="1"/>
               </a:ext>
             </a:extLst>
           </p:spPr>
@@ -6070,7 +6075,7 @@
           </a:ln>
           <a:extLst>
             <a:ext uri="{C572A759-6A51-4108-AA02-DFA0A04FC94B}">
-              <ma14:wrappingTextBoxFlag xmlns:ma14="http://schemas.microsoft.com/office/mac/drawingml/2011/main" xmlns:a14="http://schemas.microsoft.com/office/drawing/2010/main" xmlns:m="http://schemas.openxmlformats.org/officeDocument/2006/math" xmlns="" val="1"/>
+              <ma14:wrappingTextBoxFlag xmlns="" xmlns:m="http://schemas.openxmlformats.org/officeDocument/2006/math" xmlns:a14="http://schemas.microsoft.com/office/drawing/2010/main" xmlns:ma14="http://schemas.microsoft.com/office/mac/drawingml/2011/main" val="1"/>
             </a:ext>
           </a:extLst>
         </p:spPr>
@@ -6106,7 +6111,7 @@
           </a:ln>
           <a:extLst>
             <a:ext uri="{C572A759-6A51-4108-AA02-DFA0A04FC94B}">
-              <ma14:wrappingTextBoxFlag xmlns:ma14="http://schemas.microsoft.com/office/mac/drawingml/2011/main" xmlns:a14="http://schemas.microsoft.com/office/drawing/2010/main" xmlns:m="http://schemas.openxmlformats.org/officeDocument/2006/math" xmlns="" val="1"/>
+              <ma14:wrappingTextBoxFlag xmlns="" xmlns:m="http://schemas.openxmlformats.org/officeDocument/2006/math" xmlns:a14="http://schemas.microsoft.com/office/drawing/2010/main" xmlns:ma14="http://schemas.microsoft.com/office/mac/drawingml/2011/main" val="1"/>
             </a:ext>
           </a:extLst>
         </p:spPr>
@@ -6196,7 +6201,7 @@
           </a:ln>
           <a:extLst>
             <a:ext uri="{C572A759-6A51-4108-AA02-DFA0A04FC94B}">
-              <ma14:wrappingTextBoxFlag xmlns:ma14="http://schemas.microsoft.com/office/mac/drawingml/2011/main" xmlns:a14="http://schemas.microsoft.com/office/drawing/2010/main" xmlns:m="http://schemas.openxmlformats.org/officeDocument/2006/math" xmlns="" val="1"/>
+              <ma14:wrappingTextBoxFlag xmlns="" xmlns:m="http://schemas.openxmlformats.org/officeDocument/2006/math" xmlns:a14="http://schemas.microsoft.com/office/drawing/2010/main" xmlns:ma14="http://schemas.microsoft.com/office/mac/drawingml/2011/main" val="1"/>
             </a:ext>
           </a:extLst>
         </p:spPr>
@@ -6286,7 +6291,7 @@
           </a:ln>
           <a:extLst>
             <a:ext uri="{C572A759-6A51-4108-AA02-DFA0A04FC94B}">
-              <ma14:wrappingTextBoxFlag xmlns:ma14="http://schemas.microsoft.com/office/mac/drawingml/2011/main" xmlns:a14="http://schemas.microsoft.com/office/drawing/2010/main" xmlns:m="http://schemas.openxmlformats.org/officeDocument/2006/math" xmlns="" val="1"/>
+              <ma14:wrappingTextBoxFlag xmlns="" xmlns:m="http://schemas.openxmlformats.org/officeDocument/2006/math" xmlns:a14="http://schemas.microsoft.com/office/drawing/2010/main" xmlns:ma14="http://schemas.microsoft.com/office/mac/drawingml/2011/main" val="1"/>
             </a:ext>
           </a:extLst>
         </p:spPr>
@@ -6376,7 +6381,7 @@
           </a:ln>
           <a:extLst>
             <a:ext uri="{C572A759-6A51-4108-AA02-DFA0A04FC94B}">
-              <ma14:wrappingTextBoxFlag xmlns:ma14="http://schemas.microsoft.com/office/mac/drawingml/2011/main" xmlns:a14="http://schemas.microsoft.com/office/drawing/2010/main" xmlns:m="http://schemas.openxmlformats.org/officeDocument/2006/math" xmlns="" val="1"/>
+              <ma14:wrappingTextBoxFlag xmlns="" xmlns:m="http://schemas.openxmlformats.org/officeDocument/2006/math" xmlns:a14="http://schemas.microsoft.com/office/drawing/2010/main" xmlns:ma14="http://schemas.microsoft.com/office/mac/drawingml/2011/main" val="1"/>
             </a:ext>
           </a:extLst>
         </p:spPr>
@@ -6966,56 +6971,6 @@
       </p:graphicFrame>
       <p:sp>
         <p:nvSpPr>
-          <p:cNvPr id="194" name="    "/>
-          <p:cNvSpPr txBox="1"/>
-          <p:nvPr/>
-        </p:nvSpPr>
-        <p:spPr>
-          <a:xfrm>
-            <a:off x="7387981" y="4508935"/>
-            <a:ext cx="2015956" cy="477441"/>
-          </a:xfrm>
-          <a:prstGeom prst="rect">
-            <a:avLst/>
-          </a:prstGeom>
-          <a:ln w="12700">
-            <a:miter lim="400000"/>
-          </a:ln>
-          <a:extLst>
-            <a:ext uri="{C572A759-6A51-4108-AA02-DFA0A04FC94B}">
-              <ma14:wrappingTextBoxFlag xmlns:ma14="http://schemas.microsoft.com/office/mac/drawingml/2011/main" xmlns:a14="http://schemas.microsoft.com/office/drawing/2010/main" xmlns:m="http://schemas.openxmlformats.org/officeDocument/2006/math" xmlns="" val="1"/>
-            </a:ext>
-          </a:extLst>
-        </p:spPr>
-        <p:txBody>
-          <a:bodyPr wrap="none" lIns="54570" tIns="54570" rIns="54570" bIns="54570" anchor="ctr">
-            <a:spAutoFit/>
-          </a:bodyPr>
-          <a:lstStyle>
-            <a:lvl1pPr algn="ctr">
-              <a:spcBef>
-                <a:spcPts val="0"/>
-              </a:spcBef>
-              <a:defRPr sz="2900" b="0">
-                <a:solidFill>
-                  <a:srgbClr val="A6AAA9"/>
-                </a:solidFill>
-                <a:latin typeface="FontAwesome"/>
-                <a:ea typeface="FontAwesome"/>
-                <a:cs typeface="FontAwesome"/>
-                <a:sym typeface="FontAwesome"/>
-              </a:defRPr>
-            </a:lvl1pPr>
-          </a:lstStyle>
-          <a:p>
-            <a:r>
-              <a:t>    </a:t>
-            </a:r>
-          </a:p>
-        </p:txBody>
-      </p:sp>
-      <p:sp>
-        <p:nvSpPr>
           <p:cNvPr id="195" name="These are just font awesome characters"/>
           <p:cNvSpPr txBox="1"/>
           <p:nvPr/>
@@ -7033,7 +6988,7 @@
           </a:ln>
           <a:extLst>
             <a:ext uri="{C572A759-6A51-4108-AA02-DFA0A04FC94B}">
-              <ma14:wrappingTextBoxFlag xmlns:ma14="http://schemas.microsoft.com/office/mac/drawingml/2011/main" xmlns:a14="http://schemas.microsoft.com/office/drawing/2010/main" xmlns:m="http://schemas.openxmlformats.org/officeDocument/2006/math" xmlns="" val="1"/>
+              <ma14:wrappingTextBoxFlag xmlns="" xmlns:m="http://schemas.openxmlformats.org/officeDocument/2006/math" xmlns:a14="http://schemas.microsoft.com/office/drawing/2010/main" xmlns:ma14="http://schemas.microsoft.com/office/mac/drawingml/2011/main" val="1"/>
             </a:ext>
           </a:extLst>
         </p:spPr>
@@ -7095,7 +7050,7 @@
           </a:ln>
           <a:extLst>
             <a:ext uri="{C572A759-6A51-4108-AA02-DFA0A04FC94B}">
-              <ma14:wrappingTextBoxFlag xmlns:ma14="http://schemas.microsoft.com/office/mac/drawingml/2011/main" xmlns:a14="http://schemas.microsoft.com/office/drawing/2010/main" xmlns:m="http://schemas.openxmlformats.org/officeDocument/2006/math" xmlns="" val="1"/>
+              <ma14:wrappingTextBoxFlag xmlns="" xmlns:m="http://schemas.openxmlformats.org/officeDocument/2006/math" xmlns:a14="http://schemas.microsoft.com/office/drawing/2010/main" xmlns:ma14="http://schemas.microsoft.com/office/mac/drawingml/2011/main" val="1"/>
             </a:ext>
           </a:extLst>
         </p:spPr>
@@ -7131,7 +7086,7 @@
           </a:ln>
           <a:extLst>
             <a:ext uri="{C572A759-6A51-4108-AA02-DFA0A04FC94B}">
-              <ma14:wrappingTextBoxFlag xmlns:ma14="http://schemas.microsoft.com/office/mac/drawingml/2011/main" xmlns:a14="http://schemas.microsoft.com/office/drawing/2010/main" xmlns:m="http://schemas.openxmlformats.org/officeDocument/2006/math" xmlns="" val="1"/>
+              <ma14:wrappingTextBoxFlag xmlns="" xmlns:m="http://schemas.openxmlformats.org/officeDocument/2006/math" xmlns:a14="http://schemas.microsoft.com/office/drawing/2010/main" xmlns:ma14="http://schemas.microsoft.com/office/mac/drawingml/2011/main" val="1"/>
             </a:ext>
           </a:extLst>
         </p:spPr>
@@ -7167,7 +7122,7 @@
           </a:ln>
           <a:extLst>
             <a:ext uri="{C572A759-6A51-4108-AA02-DFA0A04FC94B}">
-              <ma14:wrappingTextBoxFlag xmlns:ma14="http://schemas.microsoft.com/office/mac/drawingml/2011/main" xmlns:a14="http://schemas.microsoft.com/office/drawing/2010/main" xmlns:m="http://schemas.openxmlformats.org/officeDocument/2006/math" xmlns="" val="1"/>
+              <ma14:wrappingTextBoxFlag xmlns="" xmlns:m="http://schemas.openxmlformats.org/officeDocument/2006/math" xmlns:a14="http://schemas.microsoft.com/office/drawing/2010/main" xmlns:ma14="http://schemas.microsoft.com/office/mac/drawingml/2011/main" val="1"/>
             </a:ext>
           </a:extLst>
         </p:spPr>
@@ -7203,7 +7158,7 @@
           </a:ln>
           <a:extLst>
             <a:ext uri="{C572A759-6A51-4108-AA02-DFA0A04FC94B}">
-              <ma14:wrappingTextBoxFlag xmlns:ma14="http://schemas.microsoft.com/office/mac/drawingml/2011/main" xmlns:a14="http://schemas.microsoft.com/office/drawing/2010/main" xmlns:m="http://schemas.openxmlformats.org/officeDocument/2006/math" xmlns="" val="1"/>
+              <ma14:wrappingTextBoxFlag xmlns="" xmlns:m="http://schemas.openxmlformats.org/officeDocument/2006/math" xmlns:a14="http://schemas.microsoft.com/office/drawing/2010/main" xmlns:ma14="http://schemas.microsoft.com/office/mac/drawingml/2011/main" val="1"/>
             </a:ext>
           </a:extLst>
         </p:spPr>
@@ -7239,7 +7194,7 @@
           </a:ln>
           <a:extLst>
             <a:ext uri="{C572A759-6A51-4108-AA02-DFA0A04FC94B}">
-              <ma14:wrappingTextBoxFlag xmlns:ma14="http://schemas.microsoft.com/office/mac/drawingml/2011/main" xmlns:a14="http://schemas.microsoft.com/office/drawing/2010/main" xmlns:m="http://schemas.openxmlformats.org/officeDocument/2006/math" xmlns="" val="1"/>
+              <ma14:wrappingTextBoxFlag xmlns="" xmlns:m="http://schemas.openxmlformats.org/officeDocument/2006/math" xmlns:a14="http://schemas.microsoft.com/office/drawing/2010/main" xmlns:ma14="http://schemas.microsoft.com/office/mac/drawingml/2011/main" val="1"/>
             </a:ext>
           </a:extLst>
         </p:spPr>
@@ -7281,7 +7236,7 @@
           </a:ln>
           <a:extLst>
             <a:ext uri="{C572A759-6A51-4108-AA02-DFA0A04FC94B}">
-              <ma14:wrappingTextBoxFlag xmlns:ma14="http://schemas.microsoft.com/office/mac/drawingml/2011/main" xmlns:a14="http://schemas.microsoft.com/office/drawing/2010/main" xmlns:m="http://schemas.openxmlformats.org/officeDocument/2006/math" xmlns="" val="1"/>
+              <ma14:wrappingTextBoxFlag xmlns="" xmlns:m="http://schemas.openxmlformats.org/officeDocument/2006/math" xmlns:a14="http://schemas.microsoft.com/office/drawing/2010/main" xmlns:ma14="http://schemas.microsoft.com/office/mac/drawingml/2011/main" val="1"/>
             </a:ext>
           </a:extLst>
         </p:spPr>
@@ -7368,7 +7323,7 @@
           </a:ln>
           <a:extLst>
             <a:ext uri="{C572A759-6A51-4108-AA02-DFA0A04FC94B}">
-              <ma14:wrappingTextBoxFlag xmlns:ma14="http://schemas.microsoft.com/office/mac/drawingml/2011/main" xmlns:a14="http://schemas.microsoft.com/office/drawing/2010/main" xmlns:m="http://schemas.openxmlformats.org/officeDocument/2006/math" xmlns="" val="1"/>
+              <ma14:wrappingTextBoxFlag xmlns="" xmlns:m="http://schemas.openxmlformats.org/officeDocument/2006/math" xmlns:a14="http://schemas.microsoft.com/office/drawing/2010/main" xmlns:ma14="http://schemas.microsoft.com/office/mac/drawingml/2011/main" val="1"/>
             </a:ext>
           </a:extLst>
         </p:spPr>
@@ -7523,7 +7478,7 @@
           </a:ln>
           <a:extLst>
             <a:ext uri="{C572A759-6A51-4108-AA02-DFA0A04FC94B}">
-              <ma14:wrappingTextBoxFlag xmlns:ma14="http://schemas.microsoft.com/office/mac/drawingml/2011/main" xmlns:a14="http://schemas.microsoft.com/office/drawing/2010/main" xmlns:m="http://schemas.openxmlformats.org/officeDocument/2006/math" xmlns="" val="1"/>
+              <ma14:wrappingTextBoxFlag xmlns="" xmlns:m="http://schemas.openxmlformats.org/officeDocument/2006/math" xmlns:a14="http://schemas.microsoft.com/office/drawing/2010/main" xmlns:ma14="http://schemas.microsoft.com/office/mac/drawingml/2011/main" val="1"/>
             </a:ext>
           </a:extLst>
         </p:spPr>
@@ -7646,7 +7601,7 @@
           </a:ln>
           <a:extLst>
             <a:ext uri="{C572A759-6A51-4108-AA02-DFA0A04FC94B}">
-              <ma14:wrappingTextBoxFlag xmlns:ma14="http://schemas.microsoft.com/office/mac/drawingml/2011/main" xmlns:a14="http://schemas.microsoft.com/office/drawing/2010/main" xmlns:m="http://schemas.openxmlformats.org/officeDocument/2006/math" xmlns="" val="1"/>
+              <ma14:wrappingTextBoxFlag xmlns="" xmlns:m="http://schemas.openxmlformats.org/officeDocument/2006/math" xmlns:a14="http://schemas.microsoft.com/office/drawing/2010/main" xmlns:ma14="http://schemas.microsoft.com/office/mac/drawingml/2011/main" val="1"/>
             </a:ext>
           </a:extLst>
         </p:spPr>
@@ -7769,7 +7724,7 @@
           </a:ln>
           <a:extLst>
             <a:ext uri="{C572A759-6A51-4108-AA02-DFA0A04FC94B}">
-              <ma14:wrappingTextBoxFlag xmlns:ma14="http://schemas.microsoft.com/office/mac/drawingml/2011/main" xmlns:a14="http://schemas.microsoft.com/office/drawing/2010/main" xmlns:m="http://schemas.openxmlformats.org/officeDocument/2006/math" xmlns="" val="1"/>
+              <ma14:wrappingTextBoxFlag xmlns="" xmlns:m="http://schemas.openxmlformats.org/officeDocument/2006/math" xmlns:a14="http://schemas.microsoft.com/office/drawing/2010/main" xmlns:ma14="http://schemas.microsoft.com/office/mac/drawingml/2011/main" val="1"/>
             </a:ext>
           </a:extLst>
         </p:spPr>
@@ -8043,7 +7998,7 @@
           </a:ln>
           <a:extLst>
             <a:ext uri="{C572A759-6A51-4108-AA02-DFA0A04FC94B}">
-              <ma14:wrappingTextBoxFlag xmlns:ma14="http://schemas.microsoft.com/office/mac/drawingml/2011/main" xmlns:a14="http://schemas.microsoft.com/office/drawing/2010/main" xmlns:m="http://schemas.openxmlformats.org/officeDocument/2006/math" xmlns="" val="1"/>
+              <ma14:wrappingTextBoxFlag xmlns="" xmlns:m="http://schemas.openxmlformats.org/officeDocument/2006/math" xmlns:a14="http://schemas.microsoft.com/office/drawing/2010/main" xmlns:ma14="http://schemas.microsoft.com/office/mac/drawingml/2011/main" val="1"/>
             </a:ext>
           </a:extLst>
         </p:spPr>
@@ -8201,8 +8156,8 @@
         </p:nvSpPr>
         <p:spPr>
           <a:xfrm>
-            <a:off x="10642182" y="3748683"/>
-            <a:ext cx="2912301" cy="813992"/>
+            <a:off x="10642182" y="3768178"/>
+            <a:ext cx="2912301" cy="775003"/>
           </a:xfrm>
           <a:prstGeom prst="rect">
             <a:avLst/>
@@ -8212,7 +8167,7 @@
           </a:ln>
           <a:extLst>
             <a:ext uri="{C572A759-6A51-4108-AA02-DFA0A04FC94B}">
-              <ma14:wrappingTextBoxFlag xmlns:ma14="http://schemas.microsoft.com/office/mac/drawingml/2011/main" xmlns:a14="http://schemas.microsoft.com/office/drawing/2010/main" xmlns:m="http://schemas.openxmlformats.org/officeDocument/2006/math" xmlns="" val="1"/>
+              <ma14:wrappingTextBoxFlag xmlns="" xmlns:m="http://schemas.openxmlformats.org/officeDocument/2006/math" xmlns:a14="http://schemas.microsoft.com/office/drawing/2010/main" xmlns:ma14="http://schemas.microsoft.com/office/mac/drawingml/2011/main" val="1"/>
             </a:ext>
           </a:extLst>
         </p:spPr>
@@ -8243,23 +8198,30 @@
               </a:defRPr>
             </a:pPr>
             <a:r>
+              <a:rPr dirty="0"/>
               <a:t>To use a </a:t>
             </a:r>
             <a:r>
-              <a:rPr b="1"/>
+              <a:rPr b="1" dirty="0"/>
               <a:t>font awesome</a:t>
             </a:r>
             <a:r>
+              <a:rPr dirty="0"/>
               <a:t> icon, copy and paste one from here </a:t>
             </a:r>
             <a:r>
-              <a:rPr u="sng">
+              <a:rPr lang="en-US" u="sng" dirty="0">
                 <a:hlinkClick r:id="rId9"/>
               </a:rPr>
-              <a:t>fortawesome.github.io/Font-Awesome/cheatsheet/</a:t>
+              <a:t>https://fontawesome.com/v4/cheatsheet/</a:t>
             </a:r>
             <a:r>
-              <a:t>. Then set the text font to font awesome.</a:t>
+              <a:rPr lang="en-US" u="sng" dirty="0"/>
+              <a:t>  </a:t>
+            </a:r>
+            <a:r>
+              <a:rPr dirty="0"/>
+              <a:t>Then set the text font to font awesome.</a:t>
             </a:r>
           </a:p>
         </p:txBody>
@@ -8283,7 +8245,7 @@
           </a:ln>
           <a:extLst>
             <a:ext uri="{C572A759-6A51-4108-AA02-DFA0A04FC94B}">
-              <ma14:wrappingTextBoxFlag xmlns:ma14="http://schemas.microsoft.com/office/mac/drawingml/2011/main" xmlns:a14="http://schemas.microsoft.com/office/drawing/2010/main" xmlns:m="http://schemas.openxmlformats.org/officeDocument/2006/math" xmlns="" val="1"/>
+              <ma14:wrappingTextBoxFlag xmlns="" xmlns:m="http://schemas.openxmlformats.org/officeDocument/2006/math" xmlns:a14="http://schemas.microsoft.com/office/drawing/2010/main" xmlns:ma14="http://schemas.microsoft.com/office/mac/drawingml/2011/main" val="1"/>
             </a:ext>
           </a:extLst>
         </p:spPr>
@@ -8499,7 +8461,7 @@
           </a:ln>
           <a:extLst>
             <a:ext uri="{C572A759-6A51-4108-AA02-DFA0A04FC94B}">
-              <ma14:wrappingTextBoxFlag xmlns:ma14="http://schemas.microsoft.com/office/mac/drawingml/2011/main" xmlns:a14="http://schemas.microsoft.com/office/drawing/2010/main" xmlns:m="http://schemas.openxmlformats.org/officeDocument/2006/math" xmlns="" val="1"/>
+              <ma14:wrappingTextBoxFlag xmlns="" xmlns:m="http://schemas.openxmlformats.org/officeDocument/2006/math" xmlns:a14="http://schemas.microsoft.com/office/drawing/2010/main" xmlns:ma14="http://schemas.microsoft.com/office/mac/drawingml/2011/main" val="1"/>
             </a:ext>
           </a:extLst>
         </p:spPr>
@@ -8561,7 +8523,7 @@
           </a:ln>
           <a:extLst>
             <a:ext uri="{C572A759-6A51-4108-AA02-DFA0A04FC94B}">
-              <ma14:wrappingTextBoxFlag xmlns:ma14="http://schemas.microsoft.com/office/mac/drawingml/2011/main" xmlns:a14="http://schemas.microsoft.com/office/drawing/2010/main" xmlns:m="http://schemas.openxmlformats.org/officeDocument/2006/math" xmlns="" val="1"/>
+              <ma14:wrappingTextBoxFlag xmlns="" xmlns:m="http://schemas.openxmlformats.org/officeDocument/2006/math" xmlns:a14="http://schemas.microsoft.com/office/drawing/2010/main" xmlns:ma14="http://schemas.microsoft.com/office/mac/drawingml/2011/main" val="1"/>
             </a:ext>
           </a:extLst>
         </p:spPr>
@@ -8597,7 +8559,7 @@
           </a:ln>
           <a:extLst>
             <a:ext uri="{C572A759-6A51-4108-AA02-DFA0A04FC94B}">
-              <ma14:wrappingTextBoxFlag xmlns:ma14="http://schemas.microsoft.com/office/mac/drawingml/2011/main" xmlns:a14="http://schemas.microsoft.com/office/drawing/2010/main" xmlns:m="http://schemas.openxmlformats.org/officeDocument/2006/math" xmlns="" val="1"/>
+              <ma14:wrappingTextBoxFlag xmlns="" xmlns:m="http://schemas.openxmlformats.org/officeDocument/2006/math" xmlns:a14="http://schemas.microsoft.com/office/drawing/2010/main" xmlns:ma14="http://schemas.microsoft.com/office/mac/drawingml/2011/main" val="1"/>
             </a:ext>
           </a:extLst>
         </p:spPr>
@@ -8633,7 +8595,7 @@
           </a:ln>
           <a:extLst>
             <a:ext uri="{C572A759-6A51-4108-AA02-DFA0A04FC94B}">
-              <ma14:wrappingTextBoxFlag xmlns:ma14="http://schemas.microsoft.com/office/mac/drawingml/2011/main" xmlns:a14="http://schemas.microsoft.com/office/drawing/2010/main" xmlns:m="http://schemas.openxmlformats.org/officeDocument/2006/math" xmlns="" val="1"/>
+              <ma14:wrappingTextBoxFlag xmlns="" xmlns:m="http://schemas.openxmlformats.org/officeDocument/2006/math" xmlns:a14="http://schemas.microsoft.com/office/drawing/2010/main" xmlns:ma14="http://schemas.microsoft.com/office/mac/drawingml/2011/main" val="1"/>
             </a:ext>
           </a:extLst>
         </p:spPr>
@@ -9416,7 +9378,7 @@
             <a:effectLst/>
             <a:extLst>
               <a:ext uri="{C572A759-6A51-4108-AA02-DFA0A04FC94B}">
-                <ma14:wrappingTextBoxFlag xmlns:ma14="http://schemas.microsoft.com/office/mac/drawingml/2011/main" xmlns:a14="http://schemas.microsoft.com/office/drawing/2010/main" xmlns:m="http://schemas.openxmlformats.org/officeDocument/2006/math" xmlns="" val="1"/>
+                <ma14:wrappingTextBoxFlag xmlns="" xmlns:m="http://schemas.openxmlformats.org/officeDocument/2006/math" xmlns:a14="http://schemas.microsoft.com/office/drawing/2010/main" xmlns:ma14="http://schemas.microsoft.com/office/mac/drawingml/2011/main" val="1"/>
               </a:ext>
             </a:extLst>
           </p:spPr>
@@ -17856,6 +17818,36 @@
           </a:graphicData>
         </a:graphic>
       </p:graphicFrame>
+      <p:pic>
+        <p:nvPicPr>
+          <p:cNvPr id="2" name="Picture 1">
+            <a:extLst>
+              <a:ext uri="{FF2B5EF4-FFF2-40B4-BE49-F238E27FC236}">
+                <a16:creationId xmlns:a16="http://schemas.microsoft.com/office/drawing/2014/main" id="{6981FB06-B0D2-DA00-2271-CC1802F687C4}"/>
+              </a:ext>
+            </a:extLst>
+          </p:cNvPr>
+          <p:cNvPicPr>
+            <a:picLocks noChangeAspect="1"/>
+          </p:cNvPicPr>
+          <p:nvPr/>
+        </p:nvPicPr>
+        <p:blipFill>
+          <a:blip r:embed="rId16"/>
+          <a:stretch>
+            <a:fillRect/>
+          </a:stretch>
+        </p:blipFill>
+        <p:spPr>
+          <a:xfrm>
+            <a:off x="7415064" y="4604268"/>
+            <a:ext cx="2489200" cy="419100"/>
+          </a:xfrm>
+          <a:prstGeom prst="rect">
+            <a:avLst/>
+          </a:prstGeom>
+        </p:spPr>
+      </p:pic>
     </p:spTree>
   </p:cSld>
   <p:clrMapOvr>
@@ -18813,7 +18805,7 @@
           </a:ln>
           <a:extLst>
             <a:ext uri="{C572A759-6A51-4108-AA02-DFA0A04FC94B}">
-              <ma14:wrappingTextBoxFlag xmlns:ma14="http://schemas.microsoft.com/office/mac/drawingml/2011/main" xmlns:a14="http://schemas.microsoft.com/office/drawing/2010/main" xmlns:m="http://schemas.openxmlformats.org/officeDocument/2006/math" xmlns="" val="1"/>
+              <ma14:wrappingTextBoxFlag xmlns="" xmlns:m="http://schemas.openxmlformats.org/officeDocument/2006/math" xmlns:a14="http://schemas.microsoft.com/office/drawing/2010/main" xmlns:ma14="http://schemas.microsoft.com/office/mac/drawingml/2011/main" val="1"/>
             </a:ext>
           </a:extLst>
         </p:spPr>
@@ -19573,7 +19565,7 @@
           </a:ln>
           <a:extLst>
             <a:ext uri="{C572A759-6A51-4108-AA02-DFA0A04FC94B}">
-              <ma14:wrappingTextBoxFlag xmlns:ma14="http://schemas.microsoft.com/office/mac/drawingml/2011/main" xmlns:a14="http://schemas.microsoft.com/office/drawing/2010/main" xmlns:m="http://schemas.openxmlformats.org/officeDocument/2006/math" xmlns="" val="1"/>
+              <ma14:wrappingTextBoxFlag xmlns="" xmlns:m="http://schemas.openxmlformats.org/officeDocument/2006/math" xmlns:a14="http://schemas.microsoft.com/office/drawing/2010/main" xmlns:ma14="http://schemas.microsoft.com/office/mac/drawingml/2011/main" val="1"/>
             </a:ext>
           </a:extLst>
         </p:spPr>
@@ -19621,7 +19613,7 @@
           </a:ln>
           <a:extLst>
             <a:ext uri="{C572A759-6A51-4108-AA02-DFA0A04FC94B}">
-              <ma14:wrappingTextBoxFlag xmlns:ma14="http://schemas.microsoft.com/office/mac/drawingml/2011/main" xmlns:a14="http://schemas.microsoft.com/office/drawing/2010/main" xmlns:m="http://schemas.openxmlformats.org/officeDocument/2006/math" xmlns="" val="1"/>
+              <ma14:wrappingTextBoxFlag xmlns="" xmlns:m="http://schemas.openxmlformats.org/officeDocument/2006/math" xmlns:a14="http://schemas.microsoft.com/office/drawing/2010/main" xmlns:ma14="http://schemas.microsoft.com/office/mac/drawingml/2011/main" val="1"/>
             </a:ext>
           </a:extLst>
         </p:spPr>
@@ -19691,7 +19683,7 @@
           </a:ln>
           <a:extLst>
             <a:ext uri="{C572A759-6A51-4108-AA02-DFA0A04FC94B}">
-              <ma14:wrappingTextBoxFlag xmlns:ma14="http://schemas.microsoft.com/office/mac/drawingml/2011/main" xmlns:a14="http://schemas.microsoft.com/office/drawing/2010/main" xmlns:m="http://schemas.openxmlformats.org/officeDocument/2006/math" xmlns="" val="1"/>
+              <ma14:wrappingTextBoxFlag xmlns="" xmlns:m="http://schemas.openxmlformats.org/officeDocument/2006/math" xmlns:a14="http://schemas.microsoft.com/office/drawing/2010/main" xmlns:ma14="http://schemas.microsoft.com/office/mac/drawingml/2011/main" val="1"/>
             </a:ext>
           </a:extLst>
         </p:spPr>
@@ -19746,7 +19738,7 @@
           </a:ln>
           <a:extLst>
             <a:ext uri="{C572A759-6A51-4108-AA02-DFA0A04FC94B}">
-              <ma14:wrappingTextBoxFlag xmlns:ma14="http://schemas.microsoft.com/office/mac/drawingml/2011/main" xmlns:a14="http://schemas.microsoft.com/office/drawing/2010/main" xmlns:m="http://schemas.openxmlformats.org/officeDocument/2006/math" xmlns="" val="1"/>
+              <ma14:wrappingTextBoxFlag xmlns="" xmlns:m="http://schemas.openxmlformats.org/officeDocument/2006/math" xmlns:a14="http://schemas.microsoft.com/office/drawing/2010/main" xmlns:ma14="http://schemas.microsoft.com/office/mac/drawingml/2011/main" val="1"/>
             </a:ext>
           </a:extLst>
         </p:spPr>
@@ -19828,7 +19820,7 @@
           </a:ln>
           <a:extLst>
             <a:ext uri="{C572A759-6A51-4108-AA02-DFA0A04FC94B}">
-              <ma14:wrappingTextBoxFlag xmlns:ma14="http://schemas.microsoft.com/office/mac/drawingml/2011/main" xmlns:a14="http://schemas.microsoft.com/office/drawing/2010/main" xmlns:m="http://schemas.openxmlformats.org/officeDocument/2006/math" xmlns="" val="1"/>
+              <ma14:wrappingTextBoxFlag xmlns="" xmlns:m="http://schemas.openxmlformats.org/officeDocument/2006/math" xmlns:a14="http://schemas.microsoft.com/office/drawing/2010/main" xmlns:ma14="http://schemas.microsoft.com/office/mac/drawingml/2011/main" val="1"/>
             </a:ext>
           </a:extLst>
         </p:spPr>
@@ -19887,7 +19879,7 @@
           </a:ln>
           <a:extLst>
             <a:ext uri="{C572A759-6A51-4108-AA02-DFA0A04FC94B}">
-              <ma14:wrappingTextBoxFlag xmlns:ma14="http://schemas.microsoft.com/office/mac/drawingml/2011/main" xmlns:a14="http://schemas.microsoft.com/office/drawing/2010/main" xmlns:m="http://schemas.openxmlformats.org/officeDocument/2006/math" xmlns="" val="1"/>
+              <ma14:wrappingTextBoxFlag xmlns="" xmlns:m="http://schemas.openxmlformats.org/officeDocument/2006/math" xmlns:a14="http://schemas.microsoft.com/office/drawing/2010/main" xmlns:ma14="http://schemas.microsoft.com/office/mac/drawingml/2011/main" val="1"/>
             </a:ext>
           </a:extLst>
         </p:spPr>
@@ -19995,7 +19987,7 @@
           </a:ln>
           <a:extLst>
             <a:ext uri="{C572A759-6A51-4108-AA02-DFA0A04FC94B}">
-              <ma14:wrappingTextBoxFlag xmlns:ma14="http://schemas.microsoft.com/office/mac/drawingml/2011/main" xmlns:a14="http://schemas.microsoft.com/office/drawing/2010/main" xmlns:m="http://schemas.openxmlformats.org/officeDocument/2006/math" xmlns="" val="1"/>
+              <ma14:wrappingTextBoxFlag xmlns="" xmlns:m="http://schemas.openxmlformats.org/officeDocument/2006/math" xmlns:a14="http://schemas.microsoft.com/office/drawing/2010/main" xmlns:ma14="http://schemas.microsoft.com/office/mac/drawingml/2011/main" val="1"/>
             </a:ext>
           </a:extLst>
         </p:spPr>
@@ -20060,7 +20052,7 @@
             <a:effectLst/>
             <a:extLst>
               <a:ext uri="{C572A759-6A51-4108-AA02-DFA0A04FC94B}">
-                <ma14:wrappingTextBoxFlag xmlns:ma14="http://schemas.microsoft.com/office/mac/drawingml/2011/main" xmlns:a14="http://schemas.microsoft.com/office/drawing/2010/main" xmlns:m="http://schemas.openxmlformats.org/officeDocument/2006/math" xmlns="" val="1"/>
+                <ma14:wrappingTextBoxFlag xmlns="" xmlns:m="http://schemas.openxmlformats.org/officeDocument/2006/math" xmlns:a14="http://schemas.microsoft.com/office/drawing/2010/main" xmlns:ma14="http://schemas.microsoft.com/office/mac/drawingml/2011/main" val="1"/>
               </a:ext>
             </a:extLst>
           </p:spPr>
@@ -20234,7 +20226,7 @@
             <a:effectLst/>
             <a:extLst>
               <a:ext uri="{C572A759-6A51-4108-AA02-DFA0A04FC94B}">
-                <ma14:wrappingTextBoxFlag xmlns:ma14="http://schemas.microsoft.com/office/mac/drawingml/2011/main" xmlns:a14="http://schemas.microsoft.com/office/drawing/2010/main" xmlns:m="http://schemas.openxmlformats.org/officeDocument/2006/math" xmlns="" val="1"/>
+                <ma14:wrappingTextBoxFlag xmlns="" xmlns:m="http://schemas.openxmlformats.org/officeDocument/2006/math" xmlns:a14="http://schemas.microsoft.com/office/drawing/2010/main" xmlns:ma14="http://schemas.microsoft.com/office/mac/drawingml/2011/main" val="1"/>
               </a:ext>
             </a:extLst>
           </p:spPr>
@@ -20325,7 +20317,7 @@
           </a:ln>
           <a:extLst>
             <a:ext uri="{C572A759-6A51-4108-AA02-DFA0A04FC94B}">
-              <ma14:wrappingTextBoxFlag xmlns:ma14="http://schemas.microsoft.com/office/mac/drawingml/2011/main" xmlns:a14="http://schemas.microsoft.com/office/drawing/2010/main" xmlns:m="http://schemas.openxmlformats.org/officeDocument/2006/math" xmlns="" val="1"/>
+              <ma14:wrappingTextBoxFlag xmlns="" xmlns:m="http://schemas.openxmlformats.org/officeDocument/2006/math" xmlns:a14="http://schemas.microsoft.com/office/drawing/2010/main" xmlns:ma14="http://schemas.microsoft.com/office/mac/drawingml/2011/main" val="1"/>
             </a:ext>
           </a:extLst>
         </p:spPr>
@@ -20385,7 +20377,7 @@
           </a:ln>
           <a:extLst>
             <a:ext uri="{C572A759-6A51-4108-AA02-DFA0A04FC94B}">
-              <ma14:wrappingTextBoxFlag xmlns:ma14="http://schemas.microsoft.com/office/mac/drawingml/2011/main" xmlns:a14="http://schemas.microsoft.com/office/drawing/2010/main" xmlns:m="http://schemas.openxmlformats.org/officeDocument/2006/math" xmlns="" val="1"/>
+              <ma14:wrappingTextBoxFlag xmlns="" xmlns:m="http://schemas.openxmlformats.org/officeDocument/2006/math" xmlns:a14="http://schemas.microsoft.com/office/drawing/2010/main" xmlns:ma14="http://schemas.microsoft.com/office/mac/drawingml/2011/main" val="1"/>
             </a:ext>
           </a:extLst>
         </p:spPr>
@@ -20445,7 +20437,7 @@
           </a:ln>
           <a:extLst>
             <a:ext uri="{C572A759-6A51-4108-AA02-DFA0A04FC94B}">
-              <ma14:wrappingTextBoxFlag xmlns:ma14="http://schemas.microsoft.com/office/mac/drawingml/2011/main" xmlns:a14="http://schemas.microsoft.com/office/drawing/2010/main" xmlns:m="http://schemas.openxmlformats.org/officeDocument/2006/math" xmlns="" val="1"/>
+              <ma14:wrappingTextBoxFlag xmlns="" xmlns:m="http://schemas.openxmlformats.org/officeDocument/2006/math" xmlns:a14="http://schemas.microsoft.com/office/drawing/2010/main" xmlns:ma14="http://schemas.microsoft.com/office/mac/drawingml/2011/main" val="1"/>
             </a:ext>
           </a:extLst>
         </p:spPr>
@@ -20505,7 +20497,7 @@
           </a:ln>
           <a:extLst>
             <a:ext uri="{C572A759-6A51-4108-AA02-DFA0A04FC94B}">
-              <ma14:wrappingTextBoxFlag xmlns:ma14="http://schemas.microsoft.com/office/mac/drawingml/2011/main" xmlns:a14="http://schemas.microsoft.com/office/drawing/2010/main" xmlns:m="http://schemas.openxmlformats.org/officeDocument/2006/math" xmlns="" val="1"/>
+              <ma14:wrappingTextBoxFlag xmlns="" xmlns:m="http://schemas.openxmlformats.org/officeDocument/2006/math" xmlns:a14="http://schemas.microsoft.com/office/drawing/2010/main" xmlns:ma14="http://schemas.microsoft.com/office/mac/drawingml/2011/main" val="1"/>
             </a:ext>
           </a:extLst>
         </p:spPr>
@@ -20565,7 +20557,7 @@
           </a:ln>
           <a:extLst>
             <a:ext uri="{C572A759-6A51-4108-AA02-DFA0A04FC94B}">
-              <ma14:wrappingTextBoxFlag xmlns:ma14="http://schemas.microsoft.com/office/mac/drawingml/2011/main" xmlns:a14="http://schemas.microsoft.com/office/drawing/2010/main" xmlns:m="http://schemas.openxmlformats.org/officeDocument/2006/math" xmlns="" val="1"/>
+              <ma14:wrappingTextBoxFlag xmlns="" xmlns:m="http://schemas.openxmlformats.org/officeDocument/2006/math" xmlns:a14="http://schemas.microsoft.com/office/drawing/2010/main" xmlns:ma14="http://schemas.microsoft.com/office/mac/drawingml/2011/main" val="1"/>
             </a:ext>
           </a:extLst>
         </p:spPr>
@@ -20687,7 +20679,7 @@
           </a:ln>
           <a:extLst>
             <a:ext uri="{C572A759-6A51-4108-AA02-DFA0A04FC94B}">
-              <ma14:wrappingTextBoxFlag xmlns:ma14="http://schemas.microsoft.com/office/mac/drawingml/2011/main" xmlns:a14="http://schemas.microsoft.com/office/drawing/2010/main" xmlns:m="http://schemas.openxmlformats.org/officeDocument/2006/math" xmlns="" val="1"/>
+              <ma14:wrappingTextBoxFlag xmlns="" xmlns:m="http://schemas.openxmlformats.org/officeDocument/2006/math" xmlns:a14="http://schemas.microsoft.com/office/drawing/2010/main" xmlns:ma14="http://schemas.microsoft.com/office/mac/drawingml/2011/main" val="1"/>
             </a:ext>
           </a:extLst>
         </p:spPr>
@@ -20764,7 +20756,7 @@
           </a:ln>
           <a:extLst>
             <a:ext uri="{C572A759-6A51-4108-AA02-DFA0A04FC94B}">
-              <ma14:wrappingTextBoxFlag xmlns:ma14="http://schemas.microsoft.com/office/mac/drawingml/2011/main" xmlns:a14="http://schemas.microsoft.com/office/drawing/2010/main" xmlns:m="http://schemas.openxmlformats.org/officeDocument/2006/math" xmlns="" val="1"/>
+              <ma14:wrappingTextBoxFlag xmlns="" xmlns:m="http://schemas.openxmlformats.org/officeDocument/2006/math" xmlns:a14="http://schemas.microsoft.com/office/drawing/2010/main" xmlns:ma14="http://schemas.microsoft.com/office/mac/drawingml/2011/main" val="1"/>
             </a:ext>
           </a:extLst>
         </p:spPr>
@@ -20841,7 +20833,7 @@
           </a:ln>
           <a:extLst>
             <a:ext uri="{C572A759-6A51-4108-AA02-DFA0A04FC94B}">
-              <ma14:wrappingTextBoxFlag xmlns:ma14="http://schemas.microsoft.com/office/mac/drawingml/2011/main" xmlns:a14="http://schemas.microsoft.com/office/drawing/2010/main" xmlns:m="http://schemas.openxmlformats.org/officeDocument/2006/math" xmlns="" val="1"/>
+              <ma14:wrappingTextBoxFlag xmlns="" xmlns:m="http://schemas.openxmlformats.org/officeDocument/2006/math" xmlns:a14="http://schemas.microsoft.com/office/drawing/2010/main" xmlns:ma14="http://schemas.microsoft.com/office/mac/drawingml/2011/main" val="1"/>
             </a:ext>
           </a:extLst>
         </p:spPr>
@@ -21084,7 +21076,7 @@
             <a:effectLst/>
             <a:extLst>
               <a:ext uri="{C572A759-6A51-4108-AA02-DFA0A04FC94B}">
-                <ma14:wrappingTextBoxFlag xmlns:ma14="http://schemas.microsoft.com/office/mac/drawingml/2011/main" xmlns:a14="http://schemas.microsoft.com/office/drawing/2010/main" xmlns:m="http://schemas.openxmlformats.org/officeDocument/2006/math" xmlns="" val="1"/>
+                <ma14:wrappingTextBoxFlag xmlns="" xmlns:m="http://schemas.openxmlformats.org/officeDocument/2006/math" xmlns:a14="http://schemas.microsoft.com/office/drawing/2010/main" xmlns:ma14="http://schemas.microsoft.com/office/mac/drawingml/2011/main" val="1"/>
               </a:ext>
             </a:extLst>
           </p:spPr>
@@ -21255,7 +21247,7 @@
             <a:effectLst/>
             <a:extLst>
               <a:ext uri="{C572A759-6A51-4108-AA02-DFA0A04FC94B}">
-                <ma14:wrappingTextBoxFlag xmlns:ma14="http://schemas.microsoft.com/office/mac/drawingml/2011/main" xmlns:a14="http://schemas.microsoft.com/office/drawing/2010/main" xmlns:m="http://schemas.openxmlformats.org/officeDocument/2006/math" xmlns="" val="1"/>
+                <ma14:wrappingTextBoxFlag xmlns="" xmlns:m="http://schemas.openxmlformats.org/officeDocument/2006/math" xmlns:a14="http://schemas.microsoft.com/office/drawing/2010/main" xmlns:ma14="http://schemas.microsoft.com/office/mac/drawingml/2011/main" val="1"/>
               </a:ext>
             </a:extLst>
           </p:spPr>
@@ -21369,7 +21361,7 @@
             <a:effectLst/>
             <a:extLst>
               <a:ext uri="{C572A759-6A51-4108-AA02-DFA0A04FC94B}">
-                <ma14:wrappingTextBoxFlag xmlns:ma14="http://schemas.microsoft.com/office/mac/drawingml/2011/main" xmlns:a14="http://schemas.microsoft.com/office/drawing/2010/main" xmlns:m="http://schemas.openxmlformats.org/officeDocument/2006/math" xmlns="" val="1"/>
+                <ma14:wrappingTextBoxFlag xmlns="" xmlns:m="http://schemas.openxmlformats.org/officeDocument/2006/math" xmlns:a14="http://schemas.microsoft.com/office/drawing/2010/main" xmlns:ma14="http://schemas.microsoft.com/office/mac/drawingml/2011/main" val="1"/>
               </a:ext>
             </a:extLst>
           </p:spPr>
@@ -21435,7 +21427,7 @@
             <a:effectLst/>
             <a:extLst>
               <a:ext uri="{C572A759-6A51-4108-AA02-DFA0A04FC94B}">
-                <ma14:wrappingTextBoxFlag xmlns:ma14="http://schemas.microsoft.com/office/mac/drawingml/2011/main" xmlns:a14="http://schemas.microsoft.com/office/drawing/2010/main" xmlns:m="http://schemas.openxmlformats.org/officeDocument/2006/math" xmlns="" val="1"/>
+                <ma14:wrappingTextBoxFlag xmlns="" xmlns:m="http://schemas.openxmlformats.org/officeDocument/2006/math" xmlns:a14="http://schemas.microsoft.com/office/drawing/2010/main" xmlns:ma14="http://schemas.microsoft.com/office/mac/drawingml/2011/main" val="1"/>
               </a:ext>
             </a:extLst>
           </p:spPr>
@@ -21531,7 +21523,7 @@
           </a:ln>
           <a:extLst>
             <a:ext uri="{C572A759-6A51-4108-AA02-DFA0A04FC94B}">
-              <ma14:wrappingTextBoxFlag xmlns:ma14="http://schemas.microsoft.com/office/mac/drawingml/2011/main" xmlns:a14="http://schemas.microsoft.com/office/drawing/2010/main" xmlns:m="http://schemas.openxmlformats.org/officeDocument/2006/math" xmlns="" val="1"/>
+              <ma14:wrappingTextBoxFlag xmlns="" xmlns:m="http://schemas.openxmlformats.org/officeDocument/2006/math" xmlns:a14="http://schemas.microsoft.com/office/drawing/2010/main" xmlns:ma14="http://schemas.microsoft.com/office/mac/drawingml/2011/main" val="1"/>
             </a:ext>
           </a:extLst>
         </p:spPr>
@@ -21731,7 +21723,7 @@
           </a:ln>
           <a:extLst>
             <a:ext uri="{C572A759-6A51-4108-AA02-DFA0A04FC94B}">
-              <ma14:wrappingTextBoxFlag xmlns:ma14="http://schemas.microsoft.com/office/mac/drawingml/2011/main" xmlns:a14="http://schemas.microsoft.com/office/drawing/2010/main" xmlns:m="http://schemas.openxmlformats.org/officeDocument/2006/math" xmlns="" val="1"/>
+              <ma14:wrappingTextBoxFlag xmlns="" xmlns:m="http://schemas.openxmlformats.org/officeDocument/2006/math" xmlns:a14="http://schemas.microsoft.com/office/drawing/2010/main" xmlns:ma14="http://schemas.microsoft.com/office/mac/drawingml/2011/main" val="1"/>
             </a:ext>
           </a:extLst>
         </p:spPr>
@@ -21900,7 +21892,7 @@
           </a:ln>
           <a:extLst>
             <a:ext uri="{C572A759-6A51-4108-AA02-DFA0A04FC94B}">
-              <ma14:wrappingTextBoxFlag xmlns:ma14="http://schemas.microsoft.com/office/mac/drawingml/2011/main" xmlns:a14="http://schemas.microsoft.com/office/drawing/2010/main" xmlns:m="http://schemas.openxmlformats.org/officeDocument/2006/math" xmlns="" val="1"/>
+              <ma14:wrappingTextBoxFlag xmlns="" xmlns:m="http://schemas.openxmlformats.org/officeDocument/2006/math" xmlns:a14="http://schemas.microsoft.com/office/drawing/2010/main" xmlns:ma14="http://schemas.microsoft.com/office/mac/drawingml/2011/main" val="1"/>
             </a:ext>
           </a:extLst>
         </p:spPr>
@@ -21971,7 +21963,7 @@
           </a:ln>
           <a:extLst>
             <a:ext uri="{C572A759-6A51-4108-AA02-DFA0A04FC94B}">
-              <ma14:wrappingTextBoxFlag xmlns:ma14="http://schemas.microsoft.com/office/mac/drawingml/2011/main" xmlns:a14="http://schemas.microsoft.com/office/drawing/2010/main" xmlns:m="http://schemas.openxmlformats.org/officeDocument/2006/math" xmlns="" val="1"/>
+              <ma14:wrappingTextBoxFlag xmlns="" xmlns:m="http://schemas.openxmlformats.org/officeDocument/2006/math" xmlns:a14="http://schemas.microsoft.com/office/drawing/2010/main" xmlns:ma14="http://schemas.microsoft.com/office/mac/drawingml/2011/main" val="1"/>
             </a:ext>
           </a:extLst>
         </p:spPr>
@@ -22187,7 +22179,7 @@
           </a:ln>
           <a:extLst>
             <a:ext uri="{C572A759-6A51-4108-AA02-DFA0A04FC94B}">
-              <ma14:wrappingTextBoxFlag xmlns:ma14="http://schemas.microsoft.com/office/mac/drawingml/2011/main" xmlns:a14="http://schemas.microsoft.com/office/drawing/2010/main" xmlns:m="http://schemas.openxmlformats.org/officeDocument/2006/math" xmlns="" val="1"/>
+              <ma14:wrappingTextBoxFlag xmlns="" xmlns:m="http://schemas.openxmlformats.org/officeDocument/2006/math" xmlns:a14="http://schemas.microsoft.com/office/drawing/2010/main" xmlns:ma14="http://schemas.microsoft.com/office/mac/drawingml/2011/main" val="1"/>
             </a:ext>
           </a:extLst>
         </p:spPr>
@@ -22249,7 +22241,7 @@
           </a:ln>
           <a:extLst>
             <a:ext uri="{C572A759-6A51-4108-AA02-DFA0A04FC94B}">
-              <ma14:wrappingTextBoxFlag xmlns:ma14="http://schemas.microsoft.com/office/mac/drawingml/2011/main" xmlns:a14="http://schemas.microsoft.com/office/drawing/2010/main" xmlns:m="http://schemas.openxmlformats.org/officeDocument/2006/math" xmlns="" val="1"/>
+              <ma14:wrappingTextBoxFlag xmlns="" xmlns:m="http://schemas.openxmlformats.org/officeDocument/2006/math" xmlns:a14="http://schemas.microsoft.com/office/drawing/2010/main" xmlns:ma14="http://schemas.microsoft.com/office/mac/drawingml/2011/main" val="1"/>
             </a:ext>
           </a:extLst>
         </p:spPr>
@@ -22285,7 +22277,7 @@
           </a:ln>
           <a:extLst>
             <a:ext uri="{C572A759-6A51-4108-AA02-DFA0A04FC94B}">
-              <ma14:wrappingTextBoxFlag xmlns:ma14="http://schemas.microsoft.com/office/mac/drawingml/2011/main" xmlns:a14="http://schemas.microsoft.com/office/drawing/2010/main" xmlns:m="http://schemas.openxmlformats.org/officeDocument/2006/math" xmlns="" val="1"/>
+              <ma14:wrappingTextBoxFlag xmlns="" xmlns:m="http://schemas.openxmlformats.org/officeDocument/2006/math" xmlns:a14="http://schemas.microsoft.com/office/drawing/2010/main" xmlns:ma14="http://schemas.microsoft.com/office/mac/drawingml/2011/main" val="1"/>
             </a:ext>
           </a:extLst>
         </p:spPr>
@@ -22321,7 +22313,7 @@
           </a:ln>
           <a:extLst>
             <a:ext uri="{C572A759-6A51-4108-AA02-DFA0A04FC94B}">
-              <ma14:wrappingTextBoxFlag xmlns:ma14="http://schemas.microsoft.com/office/mac/drawingml/2011/main" xmlns:a14="http://schemas.microsoft.com/office/drawing/2010/main" xmlns:m="http://schemas.openxmlformats.org/officeDocument/2006/math" xmlns="" val="1"/>
+              <ma14:wrappingTextBoxFlag xmlns="" xmlns:m="http://schemas.openxmlformats.org/officeDocument/2006/math" xmlns:a14="http://schemas.microsoft.com/office/drawing/2010/main" xmlns:ma14="http://schemas.microsoft.com/office/mac/drawingml/2011/main" val="1"/>
             </a:ext>
           </a:extLst>
         </p:spPr>
@@ -22357,7 +22349,7 @@
           </a:ln>
           <a:extLst>
             <a:ext uri="{C572A759-6A51-4108-AA02-DFA0A04FC94B}">
-              <ma14:wrappingTextBoxFlag xmlns:ma14="http://schemas.microsoft.com/office/mac/drawingml/2011/main" xmlns:a14="http://schemas.microsoft.com/office/drawing/2010/main" xmlns:m="http://schemas.openxmlformats.org/officeDocument/2006/math" xmlns="" val="1"/>
+              <ma14:wrappingTextBoxFlag xmlns="" xmlns:m="http://schemas.openxmlformats.org/officeDocument/2006/math" xmlns:a14="http://schemas.microsoft.com/office/drawing/2010/main" xmlns:ma14="http://schemas.microsoft.com/office/mac/drawingml/2011/main" val="1"/>
             </a:ext>
           </a:extLst>
         </p:spPr>
@@ -22407,7 +22399,7 @@
           </a:ln>
           <a:extLst>
             <a:ext uri="{C572A759-6A51-4108-AA02-DFA0A04FC94B}">
-              <ma14:wrappingTextBoxFlag xmlns:ma14="http://schemas.microsoft.com/office/mac/drawingml/2011/main" xmlns:a14="http://schemas.microsoft.com/office/drawing/2010/main" xmlns:m="http://schemas.openxmlformats.org/officeDocument/2006/math" xmlns="" val="1"/>
+              <ma14:wrappingTextBoxFlag xmlns="" xmlns:m="http://schemas.openxmlformats.org/officeDocument/2006/math" xmlns:a14="http://schemas.microsoft.com/office/drawing/2010/main" xmlns:ma14="http://schemas.microsoft.com/office/mac/drawingml/2011/main" val="1"/>
             </a:ext>
           </a:extLst>
         </p:spPr>
@@ -22463,7 +22455,7 @@
           </a:ln>
           <a:extLst>
             <a:ext uri="{C572A759-6A51-4108-AA02-DFA0A04FC94B}">
-              <ma14:wrappingTextBoxFlag xmlns:ma14="http://schemas.microsoft.com/office/mac/drawingml/2011/main" xmlns:a14="http://schemas.microsoft.com/office/drawing/2010/main" xmlns:m="http://schemas.openxmlformats.org/officeDocument/2006/math" xmlns="" val="1"/>
+              <ma14:wrappingTextBoxFlag xmlns="" xmlns:m="http://schemas.openxmlformats.org/officeDocument/2006/math" xmlns:a14="http://schemas.microsoft.com/office/drawing/2010/main" xmlns:ma14="http://schemas.microsoft.com/office/mac/drawingml/2011/main" val="1"/>
             </a:ext>
           </a:extLst>
         </p:spPr>
@@ -22499,7 +22491,7 @@
           </a:ln>
           <a:extLst>
             <a:ext uri="{C572A759-6A51-4108-AA02-DFA0A04FC94B}">
-              <ma14:wrappingTextBoxFlag xmlns:ma14="http://schemas.microsoft.com/office/mac/drawingml/2011/main" xmlns:a14="http://schemas.microsoft.com/office/drawing/2010/main" xmlns:m="http://schemas.openxmlformats.org/officeDocument/2006/math" xmlns="" val="1"/>
+              <ma14:wrappingTextBoxFlag xmlns="" xmlns:m="http://schemas.openxmlformats.org/officeDocument/2006/math" xmlns:a14="http://schemas.microsoft.com/office/drawing/2010/main" xmlns:ma14="http://schemas.microsoft.com/office/mac/drawingml/2011/main" val="1"/>
             </a:ext>
           </a:extLst>
         </p:spPr>
@@ -22535,7 +22527,7 @@
           </a:ln>
           <a:extLst>
             <a:ext uri="{C572A759-6A51-4108-AA02-DFA0A04FC94B}">
-              <ma14:wrappingTextBoxFlag xmlns:ma14="http://schemas.microsoft.com/office/mac/drawingml/2011/main" xmlns:a14="http://schemas.microsoft.com/office/drawing/2010/main" xmlns:m="http://schemas.openxmlformats.org/officeDocument/2006/math" xmlns="" val="1"/>
+              <ma14:wrappingTextBoxFlag xmlns="" xmlns:m="http://schemas.openxmlformats.org/officeDocument/2006/math" xmlns:a14="http://schemas.microsoft.com/office/drawing/2010/main" xmlns:ma14="http://schemas.microsoft.com/office/mac/drawingml/2011/main" val="1"/>
             </a:ext>
           </a:extLst>
         </p:spPr>
@@ -22571,7 +22563,7 @@
           </a:ln>
           <a:extLst>
             <a:ext uri="{C572A759-6A51-4108-AA02-DFA0A04FC94B}">
-              <ma14:wrappingTextBoxFlag xmlns:ma14="http://schemas.microsoft.com/office/mac/drawingml/2011/main" xmlns:a14="http://schemas.microsoft.com/office/drawing/2010/main" xmlns:m="http://schemas.openxmlformats.org/officeDocument/2006/math" xmlns="" val="1"/>
+              <ma14:wrappingTextBoxFlag xmlns="" xmlns:m="http://schemas.openxmlformats.org/officeDocument/2006/math" xmlns:a14="http://schemas.microsoft.com/office/drawing/2010/main" xmlns:ma14="http://schemas.microsoft.com/office/mac/drawingml/2011/main" val="1"/>
             </a:ext>
           </a:extLst>
         </p:spPr>
@@ -22607,7 +22599,7 @@
           </a:ln>
           <a:extLst>
             <a:ext uri="{C572A759-6A51-4108-AA02-DFA0A04FC94B}">
-              <ma14:wrappingTextBoxFlag xmlns:ma14="http://schemas.microsoft.com/office/mac/drawingml/2011/main" xmlns:a14="http://schemas.microsoft.com/office/drawing/2010/main" xmlns:m="http://schemas.openxmlformats.org/officeDocument/2006/math" xmlns="" val="1"/>
+              <ma14:wrappingTextBoxFlag xmlns="" xmlns:m="http://schemas.openxmlformats.org/officeDocument/2006/math" xmlns:a14="http://schemas.microsoft.com/office/drawing/2010/main" xmlns:ma14="http://schemas.microsoft.com/office/mac/drawingml/2011/main" val="1"/>
             </a:ext>
           </a:extLst>
         </p:spPr>
@@ -22649,7 +22641,7 @@
           </a:ln>
           <a:extLst>
             <a:ext uri="{C572A759-6A51-4108-AA02-DFA0A04FC94B}">
-              <ma14:wrappingTextBoxFlag xmlns:ma14="http://schemas.microsoft.com/office/mac/drawingml/2011/main" xmlns:a14="http://schemas.microsoft.com/office/drawing/2010/main" xmlns:m="http://schemas.openxmlformats.org/officeDocument/2006/math" xmlns="" val="1"/>
+              <ma14:wrappingTextBoxFlag xmlns="" xmlns:m="http://schemas.openxmlformats.org/officeDocument/2006/math" xmlns:a14="http://schemas.microsoft.com/office/drawing/2010/main" xmlns:ma14="http://schemas.microsoft.com/office/mac/drawingml/2011/main" val="1"/>
             </a:ext>
           </a:extLst>
         </p:spPr>
@@ -22736,7 +22728,7 @@
           </a:ln>
           <a:extLst>
             <a:ext uri="{C572A759-6A51-4108-AA02-DFA0A04FC94B}">
-              <ma14:wrappingTextBoxFlag xmlns:ma14="http://schemas.microsoft.com/office/mac/drawingml/2011/main" xmlns:a14="http://schemas.microsoft.com/office/drawing/2010/main" xmlns:m="http://schemas.openxmlformats.org/officeDocument/2006/math" xmlns="" val="1"/>
+              <ma14:wrappingTextBoxFlag xmlns="" xmlns:m="http://schemas.openxmlformats.org/officeDocument/2006/math" xmlns:a14="http://schemas.microsoft.com/office/drawing/2010/main" xmlns:ma14="http://schemas.microsoft.com/office/mac/drawingml/2011/main" val="1"/>
             </a:ext>
           </a:extLst>
         </p:spPr>
@@ -22822,7 +22814,7 @@
           </a:ln>
           <a:extLst>
             <a:ext uri="{C572A759-6A51-4108-AA02-DFA0A04FC94B}">
-              <ma14:wrappingTextBoxFlag xmlns:ma14="http://schemas.microsoft.com/office/mac/drawingml/2011/main" xmlns:a14="http://schemas.microsoft.com/office/drawing/2010/main" xmlns:m="http://schemas.openxmlformats.org/officeDocument/2006/math" xmlns="" val="1"/>
+              <ma14:wrappingTextBoxFlag xmlns="" xmlns:m="http://schemas.openxmlformats.org/officeDocument/2006/math" xmlns:a14="http://schemas.microsoft.com/office/drawing/2010/main" xmlns:ma14="http://schemas.microsoft.com/office/mac/drawingml/2011/main" val="1"/>
             </a:ext>
           </a:extLst>
         </p:spPr>
@@ -22870,7 +22862,7 @@
           </a:ln>
           <a:extLst>
             <a:ext uri="{C572A759-6A51-4108-AA02-DFA0A04FC94B}">
-              <ma14:wrappingTextBoxFlag xmlns:ma14="http://schemas.microsoft.com/office/mac/drawingml/2011/main" xmlns:a14="http://schemas.microsoft.com/office/drawing/2010/main" xmlns:m="http://schemas.openxmlformats.org/officeDocument/2006/math" xmlns="" val="1"/>
+              <ma14:wrappingTextBoxFlag xmlns="" xmlns:m="http://schemas.openxmlformats.org/officeDocument/2006/math" xmlns:a14="http://schemas.microsoft.com/office/drawing/2010/main" xmlns:ma14="http://schemas.microsoft.com/office/mac/drawingml/2011/main" val="1"/>
             </a:ext>
           </a:extLst>
         </p:spPr>
@@ -22918,7 +22910,7 @@
           </a:ln>
           <a:extLst>
             <a:ext uri="{C572A759-6A51-4108-AA02-DFA0A04FC94B}">
-              <ma14:wrappingTextBoxFlag xmlns:ma14="http://schemas.microsoft.com/office/mac/drawingml/2011/main" xmlns:a14="http://schemas.microsoft.com/office/drawing/2010/main" xmlns:m="http://schemas.openxmlformats.org/officeDocument/2006/math" xmlns="" val="1"/>
+              <ma14:wrappingTextBoxFlag xmlns="" xmlns:m="http://schemas.openxmlformats.org/officeDocument/2006/math" xmlns:a14="http://schemas.microsoft.com/office/drawing/2010/main" xmlns:ma14="http://schemas.microsoft.com/office/mac/drawingml/2011/main" val="1"/>
             </a:ext>
           </a:extLst>
         </p:spPr>
@@ -23010,7 +23002,7 @@
           </a:ln>
           <a:extLst>
             <a:ext uri="{C572A759-6A51-4108-AA02-DFA0A04FC94B}">
-              <ma14:wrappingTextBoxFlag xmlns:ma14="http://schemas.microsoft.com/office/mac/drawingml/2011/main" xmlns:a14="http://schemas.microsoft.com/office/drawing/2010/main" xmlns:m="http://schemas.openxmlformats.org/officeDocument/2006/math" xmlns="" val="1"/>
+              <ma14:wrappingTextBoxFlag xmlns="" xmlns:m="http://schemas.openxmlformats.org/officeDocument/2006/math" xmlns:a14="http://schemas.microsoft.com/office/drawing/2010/main" xmlns:ma14="http://schemas.microsoft.com/office/mac/drawingml/2011/main" val="1"/>
             </a:ext>
           </a:extLst>
         </p:spPr>
@@ -23115,7 +23107,7 @@
           </a:ln>
           <a:extLst>
             <a:ext uri="{C572A759-6A51-4108-AA02-DFA0A04FC94B}">
-              <ma14:wrappingTextBoxFlag xmlns:ma14="http://schemas.microsoft.com/office/mac/drawingml/2011/main" xmlns:a14="http://schemas.microsoft.com/office/drawing/2010/main" xmlns:m="http://schemas.openxmlformats.org/officeDocument/2006/math" xmlns="" val="1"/>
+              <ma14:wrappingTextBoxFlag xmlns="" xmlns:m="http://schemas.openxmlformats.org/officeDocument/2006/math" xmlns:a14="http://schemas.microsoft.com/office/drawing/2010/main" xmlns:ma14="http://schemas.microsoft.com/office/mac/drawingml/2011/main" val="1"/>
             </a:ext>
           </a:extLst>
         </p:spPr>
@@ -23259,7 +23251,7 @@
           </a:ln>
           <a:extLst>
             <a:ext uri="{C572A759-6A51-4108-AA02-DFA0A04FC94B}">
-              <ma14:wrappingTextBoxFlag xmlns:ma14="http://schemas.microsoft.com/office/mac/drawingml/2011/main" xmlns:a14="http://schemas.microsoft.com/office/drawing/2010/main" xmlns:m="http://schemas.openxmlformats.org/officeDocument/2006/math" xmlns="" val="1"/>
+              <ma14:wrappingTextBoxFlag xmlns="" xmlns:m="http://schemas.openxmlformats.org/officeDocument/2006/math" xmlns:a14="http://schemas.microsoft.com/office/drawing/2010/main" xmlns:ma14="http://schemas.microsoft.com/office/mac/drawingml/2011/main" val="1"/>
             </a:ext>
           </a:extLst>
         </p:spPr>
@@ -23999,7 +23991,7 @@
             <a:effectLst/>
             <a:extLst>
               <a:ext uri="{C572A759-6A51-4108-AA02-DFA0A04FC94B}">
-                <ma14:wrappingTextBoxFlag xmlns:ma14="http://schemas.microsoft.com/office/mac/drawingml/2011/main" xmlns:a14="http://schemas.microsoft.com/office/drawing/2010/main" xmlns:m="http://schemas.openxmlformats.org/officeDocument/2006/math" xmlns="" val="1"/>
+                <ma14:wrappingTextBoxFlag xmlns="" xmlns:m="http://schemas.openxmlformats.org/officeDocument/2006/math" xmlns:a14="http://schemas.microsoft.com/office/drawing/2010/main" xmlns:ma14="http://schemas.microsoft.com/office/mac/drawingml/2011/main" val="1"/>
               </a:ext>
             </a:extLst>
           </p:spPr>

</xml_diff>